<commit_message>
Actualizado el tema ITIL
</commit_message>
<xml_diff>
--- a/Documentos_generados/3. Gestion de Calidad y RRHH/Presentación3.pptx
+++ b/Documentos_generados/3. Gestion de Calidad y RRHH/Presentación3.pptx
@@ -5,10 +5,10 @@
     <p:sldMasterId id="2147483678" r:id="rId1"/>
   </p:sldMasterIdLst>
   <p:notesMasterIdLst>
-    <p:notesMasterId r:id="rId17"/>
+    <p:notesMasterId r:id="rId18"/>
   </p:notesMasterIdLst>
   <p:handoutMasterIdLst>
-    <p:handoutMasterId r:id="rId18"/>
+    <p:handoutMasterId r:id="rId19"/>
   </p:handoutMasterIdLst>
   <p:sldIdLst>
     <p:sldId id="256" r:id="rId2"/>
@@ -22,10 +22,11 @@
     <p:sldId id="290" r:id="rId10"/>
     <p:sldId id="258" r:id="rId11"/>
     <p:sldId id="291" r:id="rId12"/>
-    <p:sldId id="294" r:id="rId13"/>
-    <p:sldId id="292" r:id="rId14"/>
-    <p:sldId id="293" r:id="rId15"/>
-    <p:sldId id="280" r:id="rId16"/>
+    <p:sldId id="297" r:id="rId13"/>
+    <p:sldId id="294" r:id="rId14"/>
+    <p:sldId id="292" r:id="rId15"/>
+    <p:sldId id="293" r:id="rId16"/>
+    <p:sldId id="280" r:id="rId17"/>
   </p:sldIdLst>
   <p:sldSz cx="12192000" cy="6858000"/>
   <p:notesSz cx="6858000" cy="9144000"/>
@@ -30266,6 +30267,251 @@
           <a:chExt cx="0" cy="0"/>
         </a:xfrm>
       </p:grpSpPr>
+      <p:sp>
+        <p:nvSpPr>
+          <p:cNvPr id="2" name="Título 1">
+            <a:extLst>
+              <a:ext uri="{FF2B5EF4-FFF2-40B4-BE49-F238E27FC236}">
+                <a16:creationId xmlns:a16="http://schemas.microsoft.com/office/drawing/2014/main" id="{CA413CBD-AE65-430F-8404-E9FB685388D5}"/>
+              </a:ext>
+            </a:extLst>
+          </p:cNvPr>
+          <p:cNvSpPr>
+            <a:spLocks noGrp="1"/>
+          </p:cNvSpPr>
+          <p:nvPr>
+            <p:ph type="title"/>
+          </p:nvPr>
+        </p:nvSpPr>
+        <p:spPr/>
+        <p:txBody>
+          <a:bodyPr/>
+          <a:lstStyle/>
+          <a:p>
+            <a:r>
+              <a:rPr lang="es-ES_tradnl" dirty="0"/>
+              <a:t>Otras normativas</a:t>
+            </a:r>
+          </a:p>
+        </p:txBody>
+      </p:sp>
+      <p:sp>
+        <p:nvSpPr>
+          <p:cNvPr id="3" name="Marcador de número de diapositiva 2">
+            <a:extLst>
+              <a:ext uri="{FF2B5EF4-FFF2-40B4-BE49-F238E27FC236}">
+                <a16:creationId xmlns:a16="http://schemas.microsoft.com/office/drawing/2014/main" id="{A477BDDA-7F5C-4BF4-A74E-D5B9514C22E8}"/>
+              </a:ext>
+            </a:extLst>
+          </p:cNvPr>
+          <p:cNvSpPr>
+            <a:spLocks noGrp="1"/>
+          </p:cNvSpPr>
+          <p:nvPr>
+            <p:ph type="sldNum" sz="quarter" idx="12"/>
+          </p:nvPr>
+        </p:nvSpPr>
+        <p:spPr>
+          <a:xfrm>
+            <a:off x="8763000" y="5728502"/>
+            <a:ext cx="2743200" cy="365125"/>
+          </a:xfrm>
+        </p:spPr>
+        <p:txBody>
+          <a:bodyPr/>
+          <a:lstStyle/>
+          <a:p>
+            <a:fld id="{D6010774-2920-F049-BD0B-9A28F2A984C5}" type="slidenum">
+              <a:rPr lang="es-ES" sz="2000" smtClean="0"/>
+              <a:t>11</a:t>
+            </a:fld>
+            <a:r>
+              <a:rPr lang="es-ES" sz="2000" dirty="0"/>
+              <a:t>/</a:t>
+            </a:r>
+          </a:p>
+        </p:txBody>
+      </p:sp>
+      <p:sp>
+        <p:nvSpPr>
+          <p:cNvPr id="4" name="CuadroTexto 3">
+            <a:extLst>
+              <a:ext uri="{FF2B5EF4-FFF2-40B4-BE49-F238E27FC236}">
+                <a16:creationId xmlns:a16="http://schemas.microsoft.com/office/drawing/2014/main" id="{7B662B51-ACF4-491A-8D0D-1598535F5C66}"/>
+              </a:ext>
+            </a:extLst>
+          </p:cNvPr>
+          <p:cNvSpPr txBox="1"/>
+          <p:nvPr/>
+        </p:nvSpPr>
+        <p:spPr>
+          <a:xfrm>
+            <a:off x="1533378" y="2729132"/>
+            <a:ext cx="9636370" cy="1200329"/>
+          </a:xfrm>
+          <a:prstGeom prst="rect">
+            <a:avLst/>
+          </a:prstGeom>
+          <a:noFill/>
+        </p:spPr>
+        <p:txBody>
+          <a:bodyPr wrap="square" rtlCol="0">
+            <a:spAutoFit/>
+          </a:bodyPr>
+          <a:lstStyle/>
+          <a:p>
+            <a:r>
+              <a:rPr lang="es-ES_tradnl" dirty="0"/>
+              <a:t>Dispositivos con Marcado CE e ISO </a:t>
+            </a:r>
+            <a:r>
+              <a:rPr lang="es-ES" dirty="0"/>
+              <a:t>13485:2016</a:t>
+            </a:r>
+          </a:p>
+          <a:p>
+            <a:endParaRPr lang="es-ES" dirty="0"/>
+          </a:p>
+          <a:p>
+            <a:r>
+              <a:rPr lang="es-ES" dirty="0"/>
+              <a:t>Gestión tecnológica del servicio </a:t>
+            </a:r>
+            <a:r>
+              <a:rPr lang="es-ES" i="1" dirty="0" err="1"/>
+              <a:t>MeCuida</a:t>
+            </a:r>
+            <a:r>
+              <a:rPr lang="es-ES" dirty="0"/>
+              <a:t> -&gt; Metodología ITIL.</a:t>
+            </a:r>
+            <a:endParaRPr lang="es-ES_tradnl" dirty="0"/>
+          </a:p>
+          <a:p>
+            <a:endParaRPr lang="es-ES" dirty="0"/>
+          </a:p>
+        </p:txBody>
+      </p:sp>
+      <p:pic>
+        <p:nvPicPr>
+          <p:cNvPr id="9" name="Imagen 8">
+            <a:extLst>
+              <a:ext uri="{FF2B5EF4-FFF2-40B4-BE49-F238E27FC236}">
+                <a16:creationId xmlns:a16="http://schemas.microsoft.com/office/drawing/2014/main" id="{6290FF63-E63E-4593-AEB6-294733FF860C}"/>
+              </a:ext>
+            </a:extLst>
+          </p:cNvPr>
+          <p:cNvPicPr>
+            <a:picLocks noChangeAspect="1"/>
+          </p:cNvPicPr>
+          <p:nvPr/>
+        </p:nvPicPr>
+        <p:blipFill>
+          <a:blip r:embed="rId2"/>
+          <a:stretch>
+            <a:fillRect/>
+          </a:stretch>
+        </p:blipFill>
+        <p:spPr>
+          <a:xfrm>
+            <a:off x="1817205" y="4548989"/>
+            <a:ext cx="1905000" cy="1362075"/>
+          </a:xfrm>
+          <a:prstGeom prst="rect">
+            <a:avLst/>
+          </a:prstGeom>
+        </p:spPr>
+      </p:pic>
+      <p:pic>
+        <p:nvPicPr>
+          <p:cNvPr id="5" name="Imagen 4">
+            <a:extLst>
+              <a:ext uri="{FF2B5EF4-FFF2-40B4-BE49-F238E27FC236}">
+                <a16:creationId xmlns:a16="http://schemas.microsoft.com/office/drawing/2014/main" id="{8AE49F64-EE44-40B0-B957-D9638658DA1E}"/>
+              </a:ext>
+            </a:extLst>
+          </p:cNvPr>
+          <p:cNvPicPr>
+            <a:picLocks noChangeAspect="1"/>
+          </p:cNvPicPr>
+          <p:nvPr/>
+        </p:nvPicPr>
+        <p:blipFill>
+          <a:blip r:embed="rId3"/>
+          <a:stretch>
+            <a:fillRect/>
+          </a:stretch>
+        </p:blipFill>
+        <p:spPr>
+          <a:xfrm>
+            <a:off x="5280000" y="4158463"/>
+            <a:ext cx="2143125" cy="2143125"/>
+          </a:xfrm>
+          <a:prstGeom prst="rect">
+            <a:avLst/>
+          </a:prstGeom>
+        </p:spPr>
+      </p:pic>
+      <p:pic>
+        <p:nvPicPr>
+          <p:cNvPr id="6" name="Imagen 5">
+            <a:extLst>
+              <a:ext uri="{FF2B5EF4-FFF2-40B4-BE49-F238E27FC236}">
+                <a16:creationId xmlns:a16="http://schemas.microsoft.com/office/drawing/2014/main" id="{B452BEB5-A5F7-4D49-89C7-517F2A155389}"/>
+              </a:ext>
+            </a:extLst>
+          </p:cNvPr>
+          <p:cNvPicPr>
+            <a:picLocks noChangeAspect="1"/>
+          </p:cNvPicPr>
+          <p:nvPr/>
+        </p:nvPicPr>
+        <p:blipFill>
+          <a:blip r:embed="rId4"/>
+          <a:stretch>
+            <a:fillRect/>
+          </a:stretch>
+        </p:blipFill>
+        <p:spPr>
+          <a:xfrm>
+            <a:off x="8231670" y="4888755"/>
+            <a:ext cx="2143125" cy="946064"/>
+          </a:xfrm>
+          <a:prstGeom prst="rect">
+            <a:avLst/>
+          </a:prstGeom>
+        </p:spPr>
+      </p:pic>
+    </p:spTree>
+    <p:extLst>
+      <p:ext uri="{BB962C8B-B14F-4D97-AF65-F5344CB8AC3E}">
+        <p14:creationId xmlns:p14="http://schemas.microsoft.com/office/powerpoint/2010/main" val="1825160480"/>
+      </p:ext>
+    </p:extLst>
+  </p:cSld>
+  <p:clrMapOvr>
+    <a:masterClrMapping/>
+  </p:clrMapOvr>
+</p:sld>
+</file>
+
+<file path=ppt/slides/slide13.xml><?xml version="1.0" encoding="utf-8"?>
+<p:sld xmlns:a="http://schemas.openxmlformats.org/drawingml/2006/main" xmlns:r="http://schemas.openxmlformats.org/officeDocument/2006/relationships" xmlns:p="http://schemas.openxmlformats.org/presentationml/2006/main">
+  <p:cSld>
+    <p:spTree>
+      <p:nvGrpSpPr>
+        <p:cNvPr id="1" name=""/>
+        <p:cNvGrpSpPr/>
+        <p:nvPr/>
+      </p:nvGrpSpPr>
+      <p:grpSpPr>
+        <a:xfrm>
+          <a:off x="0" y="0"/>
+          <a:ext cx="0" cy="0"/>
+          <a:chOff x="0" y="0"/>
+          <a:chExt cx="0" cy="0"/>
+        </a:xfrm>
+      </p:grpSpPr>
       <p:pic>
         <p:nvPicPr>
           <p:cNvPr id="5" name="Imagen 4">
@@ -30579,7 +30825,7 @@
           <a:p>
             <a:fld id="{D6010774-2920-F049-BD0B-9A28F2A984C5}" type="slidenum">
               <a:rPr lang="es-ES" sz="2000" smtClean="0"/>
-              <a:t>11</a:t>
+              <a:t>12</a:t>
             </a:fld>
             <a:r>
               <a:rPr lang="es-ES" sz="2000" dirty="0"/>
@@ -30687,7 +30933,7 @@
 </p:sld>
 </file>
 
-<file path=ppt/slides/slide13.xml><?xml version="1.0" encoding="utf-8"?>
+<file path=ppt/slides/slide14.xml><?xml version="1.0" encoding="utf-8"?>
 <p:sld xmlns:a="http://schemas.openxmlformats.org/drawingml/2006/main" xmlns:r="http://schemas.openxmlformats.org/officeDocument/2006/relationships" xmlns:p="http://schemas.openxmlformats.org/presentationml/2006/main">
   <p:cSld>
     <p:spTree>
@@ -30850,7 +31096,7 @@
           <a:p>
             <a:fld id="{D6010774-2920-F049-BD0B-9A28F2A984C5}" type="slidenum">
               <a:rPr lang="es-ES" sz="2000" smtClean="0"/>
-              <a:t>12</a:t>
+              <a:t>13</a:t>
             </a:fld>
             <a:r>
               <a:rPr lang="es-ES" sz="2000" dirty="0"/>
@@ -30872,7 +31118,7 @@
 </p:sld>
 </file>
 
-<file path=ppt/slides/slide14.xml><?xml version="1.0" encoding="utf-8"?>
+<file path=ppt/slides/slide15.xml><?xml version="1.0" encoding="utf-8"?>
 <p:sld xmlns:a="http://schemas.openxmlformats.org/drawingml/2006/main" xmlns:r="http://schemas.openxmlformats.org/officeDocument/2006/relationships" xmlns:p="http://schemas.openxmlformats.org/presentationml/2006/main">
   <p:cSld>
     <p:spTree>
@@ -30967,7 +31213,7 @@
           <a:p>
             <a:fld id="{D6010774-2920-F049-BD0B-9A28F2A984C5}" type="slidenum">
               <a:rPr lang="es-ES" smtClean="0"/>
-              <a:t>13</a:t>
+              <a:t>14</a:t>
             </a:fld>
             <a:endParaRPr lang="es-ES"/>
           </a:p>
@@ -30986,7 +31232,7 @@
 </p:sld>
 </file>
 
-<file path=ppt/slides/slide15.xml><?xml version="1.0" encoding="utf-8"?>
+<file path=ppt/slides/slide16.xml><?xml version="1.0" encoding="utf-8"?>
 <p:sld xmlns:a="http://schemas.openxmlformats.org/drawingml/2006/main" xmlns:r="http://schemas.openxmlformats.org/officeDocument/2006/relationships" xmlns:p="http://schemas.openxmlformats.org/presentationml/2006/main">
   <p:cSld>
     <p:bg>
@@ -31331,7 +31577,7 @@
           <a:p>
             <a:fld id="{D6010774-2920-F049-BD0B-9A28F2A984C5}" type="slidenum">
               <a:rPr lang="es-ES" smtClean="0"/>
-              <a:t>14</a:t>
+              <a:t>15</a:t>
             </a:fld>
             <a:endParaRPr lang="es-ES"/>
           </a:p>

</xml_diff>

<commit_message>
Añadidas animaciones a Presentación3.pptx y ajuste de duración de actividades en el DICCIONARIO DE LA WBS.docx.
</commit_message>
<xml_diff>
--- a/Documentos_generados/3. Gestion de Calidad y RRHH/Presentación3.pptx
+++ b/Documentos_generados/3. Gestion de Calidad y RRHH/Presentación3.pptx
@@ -23881,7 +23881,7 @@
           <a:p>
             <a:fld id="{22EC5F80-6C64-1B4D-B2B7-2AED68CAF85F}" type="slidenum">
               <a:rPr lang="es-ES" smtClean="0"/>
-              <a:t>‹Nº›</a:t>
+              <a:t>‹#›</a:t>
             </a:fld>
             <a:endParaRPr lang="es-ES"/>
           </a:p>
@@ -24114,7 +24114,7 @@
           <a:p>
             <a:fld id="{14E37864-CDD0-ED46-84C3-11742EF3F25F}" type="slidenum">
               <a:rPr lang="es-ES" smtClean="0"/>
-              <a:t>‹Nº›</a:t>
+              <a:t>‹#›</a:t>
             </a:fld>
             <a:endParaRPr lang="es-ES"/>
           </a:p>
@@ -24446,7 +24446,7 @@
           <a:p>
             <a:fld id="{D6010774-2920-F049-BD0B-9A28F2A984C5}" type="slidenum">
               <a:rPr lang="es-ES" smtClean="0"/>
-              <a:t>‹Nº›</a:t>
+              <a:t>‹#›</a:t>
             </a:fld>
             <a:endParaRPr lang="es-ES"/>
           </a:p>
@@ -24708,7 +24708,7 @@
           <a:p>
             <a:fld id="{D6010774-2920-F049-BD0B-9A28F2A984C5}" type="slidenum">
               <a:rPr lang="es-ES" smtClean="0"/>
-              <a:t>‹Nº›</a:t>
+              <a:t>‹#›</a:t>
             </a:fld>
             <a:endParaRPr lang="es-ES"/>
           </a:p>
@@ -24954,7 +24954,7 @@
           <a:p>
             <a:fld id="{D6010774-2920-F049-BD0B-9A28F2A984C5}" type="slidenum">
               <a:rPr lang="es-ES" smtClean="0"/>
-              <a:t>‹Nº›</a:t>
+              <a:t>‹#›</a:t>
             </a:fld>
             <a:endParaRPr lang="es-ES"/>
           </a:p>
@@ -25274,7 +25274,7 @@
           <a:p>
             <a:fld id="{D6010774-2920-F049-BD0B-9A28F2A984C5}" type="slidenum">
               <a:rPr lang="es-ES" smtClean="0"/>
-              <a:t>‹Nº›</a:t>
+              <a:t>‹#›</a:t>
             </a:fld>
             <a:endParaRPr lang="es-ES"/>
           </a:p>
@@ -25752,7 +25752,7 @@
           <a:p>
             <a:fld id="{D6010774-2920-F049-BD0B-9A28F2A984C5}" type="slidenum">
               <a:rPr lang="es-ES" smtClean="0"/>
-              <a:t>‹Nº›</a:t>
+              <a:t>‹#›</a:t>
             </a:fld>
             <a:endParaRPr lang="es-ES"/>
           </a:p>
@@ -26319,7 +26319,7 @@
           <a:p>
             <a:fld id="{D6010774-2920-F049-BD0B-9A28F2A984C5}" type="slidenum">
               <a:rPr lang="es-ES" smtClean="0"/>
-              <a:t>‹Nº›</a:t>
+              <a:t>‹#›</a:t>
             </a:fld>
             <a:endParaRPr lang="es-ES"/>
           </a:p>
@@ -27123,7 +27123,7 @@
           <a:p>
             <a:fld id="{D6010774-2920-F049-BD0B-9A28F2A984C5}" type="slidenum">
               <a:rPr lang="es-ES" smtClean="0"/>
-              <a:t>‹Nº›</a:t>
+              <a:t>‹#›</a:t>
             </a:fld>
             <a:endParaRPr lang="es-ES"/>
           </a:p>
@@ -27274,7 +27274,7 @@
           <a:p>
             <a:fld id="{D6010774-2920-F049-BD0B-9A28F2A984C5}" type="slidenum">
               <a:rPr lang="es-ES" smtClean="0"/>
-              <a:t>‹Nº›</a:t>
+              <a:t>‹#›</a:t>
             </a:fld>
             <a:endParaRPr lang="es-ES"/>
           </a:p>
@@ -27483,7 +27483,7 @@
           <a:p>
             <a:fld id="{D6010774-2920-F049-BD0B-9A28F2A984C5}" type="slidenum">
               <a:rPr lang="es-ES" smtClean="0"/>
-              <a:t>‹Nº›</a:t>
+              <a:t>‹#›</a:t>
             </a:fld>
             <a:endParaRPr lang="es-ES"/>
           </a:p>
@@ -27629,7 +27629,7 @@
           <a:p>
             <a:fld id="{D6010774-2920-F049-BD0B-9A28F2A984C5}" type="slidenum">
               <a:rPr lang="es-ES" smtClean="0"/>
-              <a:t>‹Nº›</a:t>
+              <a:t>‹#›</a:t>
             </a:fld>
             <a:endParaRPr lang="es-ES"/>
           </a:p>
@@ -27933,7 +27933,7 @@
           <a:p>
             <a:fld id="{D6010774-2920-F049-BD0B-9A28F2A984C5}" type="slidenum">
               <a:rPr lang="es-ES" smtClean="0"/>
-              <a:t>‹Nº›</a:t>
+              <a:t>‹#›</a:t>
             </a:fld>
             <a:endParaRPr lang="es-ES"/>
           </a:p>
@@ -28117,7 +28117,7 @@
           <a:p>
             <a:fld id="{D6010774-2920-F049-BD0B-9A28F2A984C5}" type="slidenum">
               <a:rPr lang="es-ES" smtClean="0"/>
-              <a:t>‹Nº›</a:t>
+              <a:t>‹#›</a:t>
             </a:fld>
             <a:endParaRPr lang="es-ES"/>
           </a:p>
@@ -28458,7 +28458,7 @@
           <a:p>
             <a:fld id="{D6010774-2920-F049-BD0B-9A28F2A984C5}" type="slidenum">
               <a:rPr lang="es-ES" smtClean="0"/>
-              <a:t>‹Nº›</a:t>
+              <a:t>‹#›</a:t>
             </a:fld>
             <a:endParaRPr lang="es-ES"/>
           </a:p>
@@ -28576,7 +28576,7 @@
           <a:p>
             <a:fld id="{D6010774-2920-F049-BD0B-9A28F2A984C5}" type="slidenum">
               <a:rPr lang="es-ES" smtClean="0"/>
-              <a:t>‹Nº›</a:t>
+              <a:t>‹#›</a:t>
             </a:fld>
             <a:endParaRPr lang="es-ES"/>
           </a:p>
@@ -28671,7 +28671,7 @@
           <a:p>
             <a:fld id="{D6010774-2920-F049-BD0B-9A28F2A984C5}" type="slidenum">
               <a:rPr lang="es-ES" smtClean="0"/>
-              <a:t>‹Nº›</a:t>
+              <a:t>‹#›</a:t>
             </a:fld>
             <a:endParaRPr lang="es-ES"/>
           </a:p>
@@ -28901,7 +28901,7 @@
           <a:p>
             <a:fld id="{D6010774-2920-F049-BD0B-9A28F2A984C5}" type="slidenum">
               <a:rPr lang="es-ES" smtClean="0"/>
-              <a:t>‹Nº›</a:t>
+              <a:t>‹#›</a:t>
             </a:fld>
             <a:endParaRPr lang="es-ES"/>
           </a:p>
@@ -29163,7 +29163,7 @@
           <a:p>
             <a:fld id="{D6010774-2920-F049-BD0B-9A28F2A984C5}" type="slidenum">
               <a:rPr lang="es-ES" smtClean="0"/>
-              <a:t>‹Nº›</a:t>
+              <a:t>‹#›</a:t>
             </a:fld>
             <a:endParaRPr lang="es-ES"/>
           </a:p>
@@ -29418,7 +29418,7 @@
           <a:p>
             <a:fld id="{D6010774-2920-F049-BD0B-9A28F2A984C5}" type="slidenum">
               <a:rPr lang="es-ES" smtClean="0"/>
-              <a:t>‹Nº›</a:t>
+              <a:t>‹#›</a:t>
             </a:fld>
             <a:endParaRPr lang="es-ES"/>
           </a:p>
@@ -29857,8 +29857,8 @@
         </p:blipFill>
         <p:spPr>
           <a:xfrm>
-            <a:off x="254945" y="1902941"/>
-            <a:ext cx="5391668" cy="2310713"/>
+            <a:off x="764510" y="1902942"/>
+            <a:ext cx="4473918" cy="1917392"/>
           </a:xfrm>
           <a:prstGeom prst="rect">
             <a:avLst/>
@@ -30033,6 +30033,600 @@
   <p:clrMapOvr>
     <a:masterClrMapping/>
   </p:clrMapOvr>
+  <p:timing>
+    <p:tnLst>
+      <p:par>
+        <p:cTn id="1" dur="indefinite" restart="never" nodeType="tmRoot">
+          <p:childTnLst>
+            <p:seq concurrent="1" nextAc="seek">
+              <p:cTn id="2" dur="indefinite" nodeType="mainSeq">
+                <p:childTnLst>
+                  <p:par>
+                    <p:cTn id="3" fill="hold">
+                      <p:stCondLst>
+                        <p:cond delay="indefinite"/>
+                      </p:stCondLst>
+                      <p:childTnLst>
+                        <p:par>
+                          <p:cTn id="4" fill="hold">
+                            <p:stCondLst>
+                              <p:cond delay="0"/>
+                            </p:stCondLst>
+                            <p:childTnLst>
+                              <p:par>
+                                <p:cTn id="5" presetID="53" presetClass="entr" presetSubtype="16" fill="hold" grpId="0" nodeType="clickEffect">
+                                  <p:stCondLst>
+                                    <p:cond delay="0"/>
+                                  </p:stCondLst>
+                                  <p:childTnLst>
+                                    <p:set>
+                                      <p:cBhvr>
+                                        <p:cTn id="6" dur="1" fill="hold">
+                                          <p:stCondLst>
+                                            <p:cond delay="0"/>
+                                          </p:stCondLst>
+                                        </p:cTn>
+                                        <p:tgtEl>
+                                          <p:spTgt spid="6">
+                                            <p:graphicEl>
+                                              <a:dgm id="{8DE2072A-129D-4ED2-A2EA-4835686120E4}"/>
+                                            </p:graphicEl>
+                                          </p:spTgt>
+                                        </p:tgtEl>
+                                        <p:attrNameLst>
+                                          <p:attrName>style.visibility</p:attrName>
+                                        </p:attrNameLst>
+                                      </p:cBhvr>
+                                      <p:to>
+                                        <p:strVal val="visible"/>
+                                      </p:to>
+                                    </p:set>
+                                    <p:anim calcmode="lin" valueType="num">
+                                      <p:cBhvr>
+                                        <p:cTn id="7" dur="500" fill="hold"/>
+                                        <p:tgtEl>
+                                          <p:spTgt spid="6">
+                                            <p:graphicEl>
+                                              <a:dgm id="{8DE2072A-129D-4ED2-A2EA-4835686120E4}"/>
+                                            </p:graphicEl>
+                                          </p:spTgt>
+                                        </p:tgtEl>
+                                        <p:attrNameLst>
+                                          <p:attrName>ppt_w</p:attrName>
+                                        </p:attrNameLst>
+                                      </p:cBhvr>
+                                      <p:tavLst>
+                                        <p:tav tm="0">
+                                          <p:val>
+                                            <p:fltVal val="0"/>
+                                          </p:val>
+                                        </p:tav>
+                                        <p:tav tm="100000">
+                                          <p:val>
+                                            <p:strVal val="#ppt_w"/>
+                                          </p:val>
+                                        </p:tav>
+                                      </p:tavLst>
+                                    </p:anim>
+                                    <p:anim calcmode="lin" valueType="num">
+                                      <p:cBhvr>
+                                        <p:cTn id="8" dur="500" fill="hold"/>
+                                        <p:tgtEl>
+                                          <p:spTgt spid="6">
+                                            <p:graphicEl>
+                                              <a:dgm id="{8DE2072A-129D-4ED2-A2EA-4835686120E4}"/>
+                                            </p:graphicEl>
+                                          </p:spTgt>
+                                        </p:tgtEl>
+                                        <p:attrNameLst>
+                                          <p:attrName>ppt_h</p:attrName>
+                                        </p:attrNameLst>
+                                      </p:cBhvr>
+                                      <p:tavLst>
+                                        <p:tav tm="0">
+                                          <p:val>
+                                            <p:fltVal val="0"/>
+                                          </p:val>
+                                        </p:tav>
+                                        <p:tav tm="100000">
+                                          <p:val>
+                                            <p:strVal val="#ppt_h"/>
+                                          </p:val>
+                                        </p:tav>
+                                      </p:tavLst>
+                                    </p:anim>
+                                    <p:animEffect transition="in" filter="fade">
+                                      <p:cBhvr>
+                                        <p:cTn id="9" dur="500"/>
+                                        <p:tgtEl>
+                                          <p:spTgt spid="6">
+                                            <p:graphicEl>
+                                              <a:dgm id="{8DE2072A-129D-4ED2-A2EA-4835686120E4}"/>
+                                            </p:graphicEl>
+                                          </p:spTgt>
+                                        </p:tgtEl>
+                                      </p:cBhvr>
+                                    </p:animEffect>
+                                  </p:childTnLst>
+                                </p:cTn>
+                              </p:par>
+                            </p:childTnLst>
+                          </p:cTn>
+                        </p:par>
+                      </p:childTnLst>
+                    </p:cTn>
+                  </p:par>
+                  <p:par>
+                    <p:cTn id="10" fill="hold">
+                      <p:stCondLst>
+                        <p:cond delay="indefinite"/>
+                      </p:stCondLst>
+                      <p:childTnLst>
+                        <p:par>
+                          <p:cTn id="11" fill="hold">
+                            <p:stCondLst>
+                              <p:cond delay="0"/>
+                            </p:stCondLst>
+                            <p:childTnLst>
+                              <p:par>
+                                <p:cTn id="12" presetID="53" presetClass="entr" presetSubtype="16" fill="hold" grpId="0" nodeType="clickEffect">
+                                  <p:stCondLst>
+                                    <p:cond delay="0"/>
+                                  </p:stCondLst>
+                                  <p:childTnLst>
+                                    <p:set>
+                                      <p:cBhvr>
+                                        <p:cTn id="13" dur="1" fill="hold">
+                                          <p:stCondLst>
+                                            <p:cond delay="0"/>
+                                          </p:stCondLst>
+                                        </p:cTn>
+                                        <p:tgtEl>
+                                          <p:spTgt spid="6">
+                                            <p:graphicEl>
+                                              <a:dgm id="{7729D2EE-F3F5-4947-BAD3-F992910D4A8A}"/>
+                                            </p:graphicEl>
+                                          </p:spTgt>
+                                        </p:tgtEl>
+                                        <p:attrNameLst>
+                                          <p:attrName>style.visibility</p:attrName>
+                                        </p:attrNameLst>
+                                      </p:cBhvr>
+                                      <p:to>
+                                        <p:strVal val="visible"/>
+                                      </p:to>
+                                    </p:set>
+                                    <p:anim calcmode="lin" valueType="num">
+                                      <p:cBhvr>
+                                        <p:cTn id="14" dur="500" fill="hold"/>
+                                        <p:tgtEl>
+                                          <p:spTgt spid="6">
+                                            <p:graphicEl>
+                                              <a:dgm id="{7729D2EE-F3F5-4947-BAD3-F992910D4A8A}"/>
+                                            </p:graphicEl>
+                                          </p:spTgt>
+                                        </p:tgtEl>
+                                        <p:attrNameLst>
+                                          <p:attrName>ppt_w</p:attrName>
+                                        </p:attrNameLst>
+                                      </p:cBhvr>
+                                      <p:tavLst>
+                                        <p:tav tm="0">
+                                          <p:val>
+                                            <p:fltVal val="0"/>
+                                          </p:val>
+                                        </p:tav>
+                                        <p:tav tm="100000">
+                                          <p:val>
+                                            <p:strVal val="#ppt_w"/>
+                                          </p:val>
+                                        </p:tav>
+                                      </p:tavLst>
+                                    </p:anim>
+                                    <p:anim calcmode="lin" valueType="num">
+                                      <p:cBhvr>
+                                        <p:cTn id="15" dur="500" fill="hold"/>
+                                        <p:tgtEl>
+                                          <p:spTgt spid="6">
+                                            <p:graphicEl>
+                                              <a:dgm id="{7729D2EE-F3F5-4947-BAD3-F992910D4A8A}"/>
+                                            </p:graphicEl>
+                                          </p:spTgt>
+                                        </p:tgtEl>
+                                        <p:attrNameLst>
+                                          <p:attrName>ppt_h</p:attrName>
+                                        </p:attrNameLst>
+                                      </p:cBhvr>
+                                      <p:tavLst>
+                                        <p:tav tm="0">
+                                          <p:val>
+                                            <p:fltVal val="0"/>
+                                          </p:val>
+                                        </p:tav>
+                                        <p:tav tm="100000">
+                                          <p:val>
+                                            <p:strVal val="#ppt_h"/>
+                                          </p:val>
+                                        </p:tav>
+                                      </p:tavLst>
+                                    </p:anim>
+                                    <p:animEffect transition="in" filter="fade">
+                                      <p:cBhvr>
+                                        <p:cTn id="16" dur="500"/>
+                                        <p:tgtEl>
+                                          <p:spTgt spid="6">
+                                            <p:graphicEl>
+                                              <a:dgm id="{7729D2EE-F3F5-4947-BAD3-F992910D4A8A}"/>
+                                            </p:graphicEl>
+                                          </p:spTgt>
+                                        </p:tgtEl>
+                                      </p:cBhvr>
+                                    </p:animEffect>
+                                  </p:childTnLst>
+                                </p:cTn>
+                              </p:par>
+                              <p:par>
+                                <p:cTn id="17" presetID="53" presetClass="entr" presetSubtype="16" fill="hold" grpId="0" nodeType="withEffect">
+                                  <p:stCondLst>
+                                    <p:cond delay="0"/>
+                                  </p:stCondLst>
+                                  <p:childTnLst>
+                                    <p:set>
+                                      <p:cBhvr>
+                                        <p:cTn id="18" dur="1" fill="hold">
+                                          <p:stCondLst>
+                                            <p:cond delay="0"/>
+                                          </p:stCondLst>
+                                        </p:cTn>
+                                        <p:tgtEl>
+                                          <p:spTgt spid="6">
+                                            <p:graphicEl>
+                                              <a:dgm id="{44F1A0CC-49C9-4B0C-B459-27C6274EBE93}"/>
+                                            </p:graphicEl>
+                                          </p:spTgt>
+                                        </p:tgtEl>
+                                        <p:attrNameLst>
+                                          <p:attrName>style.visibility</p:attrName>
+                                        </p:attrNameLst>
+                                      </p:cBhvr>
+                                      <p:to>
+                                        <p:strVal val="visible"/>
+                                      </p:to>
+                                    </p:set>
+                                    <p:anim calcmode="lin" valueType="num">
+                                      <p:cBhvr>
+                                        <p:cTn id="19" dur="500" fill="hold"/>
+                                        <p:tgtEl>
+                                          <p:spTgt spid="6">
+                                            <p:graphicEl>
+                                              <a:dgm id="{44F1A0CC-49C9-4B0C-B459-27C6274EBE93}"/>
+                                            </p:graphicEl>
+                                          </p:spTgt>
+                                        </p:tgtEl>
+                                        <p:attrNameLst>
+                                          <p:attrName>ppt_w</p:attrName>
+                                        </p:attrNameLst>
+                                      </p:cBhvr>
+                                      <p:tavLst>
+                                        <p:tav tm="0">
+                                          <p:val>
+                                            <p:fltVal val="0"/>
+                                          </p:val>
+                                        </p:tav>
+                                        <p:tav tm="100000">
+                                          <p:val>
+                                            <p:strVal val="#ppt_w"/>
+                                          </p:val>
+                                        </p:tav>
+                                      </p:tavLst>
+                                    </p:anim>
+                                    <p:anim calcmode="lin" valueType="num">
+                                      <p:cBhvr>
+                                        <p:cTn id="20" dur="500" fill="hold"/>
+                                        <p:tgtEl>
+                                          <p:spTgt spid="6">
+                                            <p:graphicEl>
+                                              <a:dgm id="{44F1A0CC-49C9-4B0C-B459-27C6274EBE93}"/>
+                                            </p:graphicEl>
+                                          </p:spTgt>
+                                        </p:tgtEl>
+                                        <p:attrNameLst>
+                                          <p:attrName>ppt_h</p:attrName>
+                                        </p:attrNameLst>
+                                      </p:cBhvr>
+                                      <p:tavLst>
+                                        <p:tav tm="0">
+                                          <p:val>
+                                            <p:fltVal val="0"/>
+                                          </p:val>
+                                        </p:tav>
+                                        <p:tav tm="100000">
+                                          <p:val>
+                                            <p:strVal val="#ppt_h"/>
+                                          </p:val>
+                                        </p:tav>
+                                      </p:tavLst>
+                                    </p:anim>
+                                    <p:animEffect transition="in" filter="fade">
+                                      <p:cBhvr>
+                                        <p:cTn id="21" dur="500"/>
+                                        <p:tgtEl>
+                                          <p:spTgt spid="6">
+                                            <p:graphicEl>
+                                              <a:dgm id="{44F1A0CC-49C9-4B0C-B459-27C6274EBE93}"/>
+                                            </p:graphicEl>
+                                          </p:spTgt>
+                                        </p:tgtEl>
+                                      </p:cBhvr>
+                                    </p:animEffect>
+                                  </p:childTnLst>
+                                </p:cTn>
+                              </p:par>
+                            </p:childTnLst>
+                          </p:cTn>
+                        </p:par>
+                      </p:childTnLst>
+                    </p:cTn>
+                  </p:par>
+                  <p:par>
+                    <p:cTn id="22" fill="hold">
+                      <p:stCondLst>
+                        <p:cond delay="indefinite"/>
+                      </p:stCondLst>
+                      <p:childTnLst>
+                        <p:par>
+                          <p:cTn id="23" fill="hold">
+                            <p:stCondLst>
+                              <p:cond delay="0"/>
+                            </p:stCondLst>
+                            <p:childTnLst>
+                              <p:par>
+                                <p:cTn id="24" presetID="53" presetClass="entr" presetSubtype="16" fill="hold" grpId="0" nodeType="clickEffect">
+                                  <p:stCondLst>
+                                    <p:cond delay="0"/>
+                                  </p:stCondLst>
+                                  <p:childTnLst>
+                                    <p:set>
+                                      <p:cBhvr>
+                                        <p:cTn id="25" dur="1" fill="hold">
+                                          <p:stCondLst>
+                                            <p:cond delay="0"/>
+                                          </p:stCondLst>
+                                        </p:cTn>
+                                        <p:tgtEl>
+                                          <p:spTgt spid="6">
+                                            <p:graphicEl>
+                                              <a:dgm id="{058EDF98-D69D-4850-A7EE-7423CED16A92}"/>
+                                            </p:graphicEl>
+                                          </p:spTgt>
+                                        </p:tgtEl>
+                                        <p:attrNameLst>
+                                          <p:attrName>style.visibility</p:attrName>
+                                        </p:attrNameLst>
+                                      </p:cBhvr>
+                                      <p:to>
+                                        <p:strVal val="visible"/>
+                                      </p:to>
+                                    </p:set>
+                                    <p:anim calcmode="lin" valueType="num">
+                                      <p:cBhvr>
+                                        <p:cTn id="26" dur="500" fill="hold"/>
+                                        <p:tgtEl>
+                                          <p:spTgt spid="6">
+                                            <p:graphicEl>
+                                              <a:dgm id="{058EDF98-D69D-4850-A7EE-7423CED16A92}"/>
+                                            </p:graphicEl>
+                                          </p:spTgt>
+                                        </p:tgtEl>
+                                        <p:attrNameLst>
+                                          <p:attrName>ppt_w</p:attrName>
+                                        </p:attrNameLst>
+                                      </p:cBhvr>
+                                      <p:tavLst>
+                                        <p:tav tm="0">
+                                          <p:val>
+                                            <p:fltVal val="0"/>
+                                          </p:val>
+                                        </p:tav>
+                                        <p:tav tm="100000">
+                                          <p:val>
+                                            <p:strVal val="#ppt_w"/>
+                                          </p:val>
+                                        </p:tav>
+                                      </p:tavLst>
+                                    </p:anim>
+                                    <p:anim calcmode="lin" valueType="num">
+                                      <p:cBhvr>
+                                        <p:cTn id="27" dur="500" fill="hold"/>
+                                        <p:tgtEl>
+                                          <p:spTgt spid="6">
+                                            <p:graphicEl>
+                                              <a:dgm id="{058EDF98-D69D-4850-A7EE-7423CED16A92}"/>
+                                            </p:graphicEl>
+                                          </p:spTgt>
+                                        </p:tgtEl>
+                                        <p:attrNameLst>
+                                          <p:attrName>ppt_h</p:attrName>
+                                        </p:attrNameLst>
+                                      </p:cBhvr>
+                                      <p:tavLst>
+                                        <p:tav tm="0">
+                                          <p:val>
+                                            <p:fltVal val="0"/>
+                                          </p:val>
+                                        </p:tav>
+                                        <p:tav tm="100000">
+                                          <p:val>
+                                            <p:strVal val="#ppt_h"/>
+                                          </p:val>
+                                        </p:tav>
+                                      </p:tavLst>
+                                    </p:anim>
+                                    <p:animEffect transition="in" filter="fade">
+                                      <p:cBhvr>
+                                        <p:cTn id="28" dur="500"/>
+                                        <p:tgtEl>
+                                          <p:spTgt spid="6">
+                                            <p:graphicEl>
+                                              <a:dgm id="{058EDF98-D69D-4850-A7EE-7423CED16A92}"/>
+                                            </p:graphicEl>
+                                          </p:spTgt>
+                                        </p:tgtEl>
+                                      </p:cBhvr>
+                                    </p:animEffect>
+                                  </p:childTnLst>
+                                </p:cTn>
+                              </p:par>
+                            </p:childTnLst>
+                          </p:cTn>
+                        </p:par>
+                      </p:childTnLst>
+                    </p:cTn>
+                  </p:par>
+                  <p:par>
+                    <p:cTn id="29" fill="hold">
+                      <p:stCondLst>
+                        <p:cond delay="indefinite"/>
+                      </p:stCondLst>
+                      <p:childTnLst>
+                        <p:par>
+                          <p:cTn id="30" fill="hold">
+                            <p:stCondLst>
+                              <p:cond delay="0"/>
+                            </p:stCondLst>
+                            <p:childTnLst>
+                              <p:par>
+                                <p:cTn id="31" presetID="53" presetClass="entr" presetSubtype="16" fill="hold" grpId="0" nodeType="clickEffect">
+                                  <p:stCondLst>
+                                    <p:cond delay="0"/>
+                                  </p:stCondLst>
+                                  <p:childTnLst>
+                                    <p:set>
+                                      <p:cBhvr>
+                                        <p:cTn id="32" dur="1" fill="hold">
+                                          <p:stCondLst>
+                                            <p:cond delay="0"/>
+                                          </p:stCondLst>
+                                        </p:cTn>
+                                        <p:tgtEl>
+                                          <p:spTgt spid="6">
+                                            <p:graphicEl>
+                                              <a:dgm id="{38068B84-2D50-4738-AAA8-AE29F2F9B2DC}"/>
+                                            </p:graphicEl>
+                                          </p:spTgt>
+                                        </p:tgtEl>
+                                        <p:attrNameLst>
+                                          <p:attrName>style.visibility</p:attrName>
+                                        </p:attrNameLst>
+                                      </p:cBhvr>
+                                      <p:to>
+                                        <p:strVal val="visible"/>
+                                      </p:to>
+                                    </p:set>
+                                    <p:anim calcmode="lin" valueType="num">
+                                      <p:cBhvr>
+                                        <p:cTn id="33" dur="500" fill="hold"/>
+                                        <p:tgtEl>
+                                          <p:spTgt spid="6">
+                                            <p:graphicEl>
+                                              <a:dgm id="{38068B84-2D50-4738-AAA8-AE29F2F9B2DC}"/>
+                                            </p:graphicEl>
+                                          </p:spTgt>
+                                        </p:tgtEl>
+                                        <p:attrNameLst>
+                                          <p:attrName>ppt_w</p:attrName>
+                                        </p:attrNameLst>
+                                      </p:cBhvr>
+                                      <p:tavLst>
+                                        <p:tav tm="0">
+                                          <p:val>
+                                            <p:fltVal val="0"/>
+                                          </p:val>
+                                        </p:tav>
+                                        <p:tav tm="100000">
+                                          <p:val>
+                                            <p:strVal val="#ppt_w"/>
+                                          </p:val>
+                                        </p:tav>
+                                      </p:tavLst>
+                                    </p:anim>
+                                    <p:anim calcmode="lin" valueType="num">
+                                      <p:cBhvr>
+                                        <p:cTn id="34" dur="500" fill="hold"/>
+                                        <p:tgtEl>
+                                          <p:spTgt spid="6">
+                                            <p:graphicEl>
+                                              <a:dgm id="{38068B84-2D50-4738-AAA8-AE29F2F9B2DC}"/>
+                                            </p:graphicEl>
+                                          </p:spTgt>
+                                        </p:tgtEl>
+                                        <p:attrNameLst>
+                                          <p:attrName>ppt_h</p:attrName>
+                                        </p:attrNameLst>
+                                      </p:cBhvr>
+                                      <p:tavLst>
+                                        <p:tav tm="0">
+                                          <p:val>
+                                            <p:fltVal val="0"/>
+                                          </p:val>
+                                        </p:tav>
+                                        <p:tav tm="100000">
+                                          <p:val>
+                                            <p:strVal val="#ppt_h"/>
+                                          </p:val>
+                                        </p:tav>
+                                      </p:tavLst>
+                                    </p:anim>
+                                    <p:animEffect transition="in" filter="fade">
+                                      <p:cBhvr>
+                                        <p:cTn id="35" dur="500"/>
+                                        <p:tgtEl>
+                                          <p:spTgt spid="6">
+                                            <p:graphicEl>
+                                              <a:dgm id="{38068B84-2D50-4738-AAA8-AE29F2F9B2DC}"/>
+                                            </p:graphicEl>
+                                          </p:spTgt>
+                                        </p:tgtEl>
+                                      </p:cBhvr>
+                                    </p:animEffect>
+                                  </p:childTnLst>
+                                </p:cTn>
+                              </p:par>
+                            </p:childTnLst>
+                          </p:cTn>
+                        </p:par>
+                      </p:childTnLst>
+                    </p:cTn>
+                  </p:par>
+                </p:childTnLst>
+              </p:cTn>
+              <p:prevCondLst>
+                <p:cond evt="onPrev" delay="0">
+                  <p:tgtEl>
+                    <p:sldTgt/>
+                  </p:tgtEl>
+                </p:cond>
+              </p:prevCondLst>
+              <p:nextCondLst>
+                <p:cond evt="onNext" delay="0">
+                  <p:tgtEl>
+                    <p:sldTgt/>
+                  </p:tgtEl>
+                </p:cond>
+              </p:nextCondLst>
+            </p:seq>
+          </p:childTnLst>
+        </p:cTn>
+      </p:par>
+    </p:tnLst>
+    <p:bldLst>
+      <p:bldGraphic spid="6" grpId="0">
+        <p:bldSub>
+          <a:bldDgm bld="one"/>
+        </p:bldSub>
+      </p:bldGraphic>
+    </p:bldLst>
+  </p:timing>
 </p:sld>
 </file>
 
@@ -31910,6 +32504,502 @@
   <p:clrMapOvr>
     <a:masterClrMapping/>
   </p:clrMapOvr>
+  <p:timing>
+    <p:tnLst>
+      <p:par>
+        <p:cTn id="1" dur="indefinite" restart="never" nodeType="tmRoot">
+          <p:childTnLst>
+            <p:seq concurrent="1" nextAc="seek">
+              <p:cTn id="2" dur="indefinite" nodeType="mainSeq">
+                <p:childTnLst>
+                  <p:par>
+                    <p:cTn id="3" fill="hold">
+                      <p:stCondLst>
+                        <p:cond delay="indefinite"/>
+                      </p:stCondLst>
+                      <p:childTnLst>
+                        <p:par>
+                          <p:cTn id="4" fill="hold">
+                            <p:stCondLst>
+                              <p:cond delay="0"/>
+                            </p:stCondLst>
+                            <p:childTnLst>
+                              <p:par>
+                                <p:cTn id="5" presetID="10" presetClass="entr" presetSubtype="0" fill="hold" grpId="0" nodeType="clickEffect">
+                                  <p:stCondLst>
+                                    <p:cond delay="0"/>
+                                  </p:stCondLst>
+                                  <p:childTnLst>
+                                    <p:set>
+                                      <p:cBhvr>
+                                        <p:cTn id="6" dur="1" fill="hold">
+                                          <p:stCondLst>
+                                            <p:cond delay="0"/>
+                                          </p:stCondLst>
+                                        </p:cTn>
+                                        <p:tgtEl>
+                                          <p:spTgt spid="6">
+                                            <p:graphicEl>
+                                              <a:dgm id="{9424BBEB-B53A-4BAE-9AA3-7349701FD205}"/>
+                                            </p:graphicEl>
+                                          </p:spTgt>
+                                        </p:tgtEl>
+                                        <p:attrNameLst>
+                                          <p:attrName>style.visibility</p:attrName>
+                                        </p:attrNameLst>
+                                      </p:cBhvr>
+                                      <p:to>
+                                        <p:strVal val="visible"/>
+                                      </p:to>
+                                    </p:set>
+                                    <p:animEffect transition="in" filter="fade">
+                                      <p:cBhvr>
+                                        <p:cTn id="7" dur="500"/>
+                                        <p:tgtEl>
+                                          <p:spTgt spid="6">
+                                            <p:graphicEl>
+                                              <a:dgm id="{9424BBEB-B53A-4BAE-9AA3-7349701FD205}"/>
+                                            </p:graphicEl>
+                                          </p:spTgt>
+                                        </p:tgtEl>
+                                      </p:cBhvr>
+                                    </p:animEffect>
+                                  </p:childTnLst>
+                                </p:cTn>
+                              </p:par>
+                              <p:par>
+                                <p:cTn id="8" presetID="10" presetClass="entr" presetSubtype="0" fill="hold" grpId="0" nodeType="withEffect">
+                                  <p:stCondLst>
+                                    <p:cond delay="0"/>
+                                  </p:stCondLst>
+                                  <p:childTnLst>
+                                    <p:set>
+                                      <p:cBhvr>
+                                        <p:cTn id="9" dur="1" fill="hold">
+                                          <p:stCondLst>
+                                            <p:cond delay="0"/>
+                                          </p:stCondLst>
+                                        </p:cTn>
+                                        <p:tgtEl>
+                                          <p:spTgt spid="6">
+                                            <p:graphicEl>
+                                              <a:dgm id="{2E3A7CCC-AD74-4634-9862-9ED327ADCE6A}"/>
+                                            </p:graphicEl>
+                                          </p:spTgt>
+                                        </p:tgtEl>
+                                        <p:attrNameLst>
+                                          <p:attrName>style.visibility</p:attrName>
+                                        </p:attrNameLst>
+                                      </p:cBhvr>
+                                      <p:to>
+                                        <p:strVal val="visible"/>
+                                      </p:to>
+                                    </p:set>
+                                    <p:animEffect transition="in" filter="fade">
+                                      <p:cBhvr>
+                                        <p:cTn id="10" dur="500"/>
+                                        <p:tgtEl>
+                                          <p:spTgt spid="6">
+                                            <p:graphicEl>
+                                              <a:dgm id="{2E3A7CCC-AD74-4634-9862-9ED327ADCE6A}"/>
+                                            </p:graphicEl>
+                                          </p:spTgt>
+                                        </p:tgtEl>
+                                      </p:cBhvr>
+                                    </p:animEffect>
+                                  </p:childTnLst>
+                                </p:cTn>
+                              </p:par>
+                              <p:par>
+                                <p:cTn id="11" presetID="10" presetClass="entr" presetSubtype="0" fill="hold" grpId="0" nodeType="withEffect">
+                                  <p:stCondLst>
+                                    <p:cond delay="0"/>
+                                  </p:stCondLst>
+                                  <p:childTnLst>
+                                    <p:set>
+                                      <p:cBhvr>
+                                        <p:cTn id="12" dur="1" fill="hold">
+                                          <p:stCondLst>
+                                            <p:cond delay="0"/>
+                                          </p:stCondLst>
+                                        </p:cTn>
+                                        <p:tgtEl>
+                                          <p:spTgt spid="6">
+                                            <p:graphicEl>
+                                              <a:dgm id="{8E9CFAB5-6530-43DC-BD52-AE67075EA74A}"/>
+                                            </p:graphicEl>
+                                          </p:spTgt>
+                                        </p:tgtEl>
+                                        <p:attrNameLst>
+                                          <p:attrName>style.visibility</p:attrName>
+                                        </p:attrNameLst>
+                                      </p:cBhvr>
+                                      <p:to>
+                                        <p:strVal val="visible"/>
+                                      </p:to>
+                                    </p:set>
+                                    <p:animEffect transition="in" filter="fade">
+                                      <p:cBhvr>
+                                        <p:cTn id="13" dur="500"/>
+                                        <p:tgtEl>
+                                          <p:spTgt spid="6">
+                                            <p:graphicEl>
+                                              <a:dgm id="{8E9CFAB5-6530-43DC-BD52-AE67075EA74A}"/>
+                                            </p:graphicEl>
+                                          </p:spTgt>
+                                        </p:tgtEl>
+                                      </p:cBhvr>
+                                    </p:animEffect>
+                                  </p:childTnLst>
+                                </p:cTn>
+                              </p:par>
+                            </p:childTnLst>
+                          </p:cTn>
+                        </p:par>
+                      </p:childTnLst>
+                    </p:cTn>
+                  </p:par>
+                  <p:par>
+                    <p:cTn id="14" fill="hold">
+                      <p:stCondLst>
+                        <p:cond delay="indefinite"/>
+                      </p:stCondLst>
+                      <p:childTnLst>
+                        <p:par>
+                          <p:cTn id="15" fill="hold">
+                            <p:stCondLst>
+                              <p:cond delay="0"/>
+                            </p:stCondLst>
+                            <p:childTnLst>
+                              <p:par>
+                                <p:cTn id="16" presetID="10" presetClass="entr" presetSubtype="0" fill="hold" grpId="0" nodeType="clickEffect">
+                                  <p:stCondLst>
+                                    <p:cond delay="0"/>
+                                  </p:stCondLst>
+                                  <p:childTnLst>
+                                    <p:set>
+                                      <p:cBhvr>
+                                        <p:cTn id="17" dur="1" fill="hold">
+                                          <p:stCondLst>
+                                            <p:cond delay="0"/>
+                                          </p:stCondLst>
+                                        </p:cTn>
+                                        <p:tgtEl>
+                                          <p:spTgt spid="6">
+                                            <p:graphicEl>
+                                              <a:dgm id="{C7DD3862-EA8E-4D72-9F7F-C4EF5C5B048C}"/>
+                                            </p:graphicEl>
+                                          </p:spTgt>
+                                        </p:tgtEl>
+                                        <p:attrNameLst>
+                                          <p:attrName>style.visibility</p:attrName>
+                                        </p:attrNameLst>
+                                      </p:cBhvr>
+                                      <p:to>
+                                        <p:strVal val="visible"/>
+                                      </p:to>
+                                    </p:set>
+                                    <p:animEffect transition="in" filter="fade">
+                                      <p:cBhvr>
+                                        <p:cTn id="18" dur="500"/>
+                                        <p:tgtEl>
+                                          <p:spTgt spid="6">
+                                            <p:graphicEl>
+                                              <a:dgm id="{C7DD3862-EA8E-4D72-9F7F-C4EF5C5B048C}"/>
+                                            </p:graphicEl>
+                                          </p:spTgt>
+                                        </p:tgtEl>
+                                      </p:cBhvr>
+                                    </p:animEffect>
+                                  </p:childTnLst>
+                                </p:cTn>
+                              </p:par>
+                              <p:par>
+                                <p:cTn id="19" presetID="10" presetClass="entr" presetSubtype="0" fill="hold" grpId="0" nodeType="withEffect">
+                                  <p:stCondLst>
+                                    <p:cond delay="0"/>
+                                  </p:stCondLst>
+                                  <p:childTnLst>
+                                    <p:set>
+                                      <p:cBhvr>
+                                        <p:cTn id="20" dur="1" fill="hold">
+                                          <p:stCondLst>
+                                            <p:cond delay="0"/>
+                                          </p:stCondLst>
+                                        </p:cTn>
+                                        <p:tgtEl>
+                                          <p:spTgt spid="6">
+                                            <p:graphicEl>
+                                              <a:dgm id="{BA71267A-8A01-4F05-9A6D-CBED4D7308AE}"/>
+                                            </p:graphicEl>
+                                          </p:spTgt>
+                                        </p:tgtEl>
+                                        <p:attrNameLst>
+                                          <p:attrName>style.visibility</p:attrName>
+                                        </p:attrNameLst>
+                                      </p:cBhvr>
+                                      <p:to>
+                                        <p:strVal val="visible"/>
+                                      </p:to>
+                                    </p:set>
+                                    <p:animEffect transition="in" filter="fade">
+                                      <p:cBhvr>
+                                        <p:cTn id="21" dur="500"/>
+                                        <p:tgtEl>
+                                          <p:spTgt spid="6">
+                                            <p:graphicEl>
+                                              <a:dgm id="{BA71267A-8A01-4F05-9A6D-CBED4D7308AE}"/>
+                                            </p:graphicEl>
+                                          </p:spTgt>
+                                        </p:tgtEl>
+                                      </p:cBhvr>
+                                    </p:animEffect>
+                                  </p:childTnLst>
+                                </p:cTn>
+                              </p:par>
+                            </p:childTnLst>
+                          </p:cTn>
+                        </p:par>
+                      </p:childTnLst>
+                    </p:cTn>
+                  </p:par>
+                  <p:par>
+                    <p:cTn id="22" fill="hold">
+                      <p:stCondLst>
+                        <p:cond delay="indefinite"/>
+                      </p:stCondLst>
+                      <p:childTnLst>
+                        <p:par>
+                          <p:cTn id="23" fill="hold">
+                            <p:stCondLst>
+                              <p:cond delay="0"/>
+                            </p:stCondLst>
+                            <p:childTnLst>
+                              <p:par>
+                                <p:cTn id="24" presetID="10" presetClass="entr" presetSubtype="0" fill="hold" grpId="0" nodeType="clickEffect">
+                                  <p:stCondLst>
+                                    <p:cond delay="0"/>
+                                  </p:stCondLst>
+                                  <p:childTnLst>
+                                    <p:set>
+                                      <p:cBhvr>
+                                        <p:cTn id="25" dur="1" fill="hold">
+                                          <p:stCondLst>
+                                            <p:cond delay="0"/>
+                                          </p:stCondLst>
+                                        </p:cTn>
+                                        <p:tgtEl>
+                                          <p:spTgt spid="6">
+                                            <p:graphicEl>
+                                              <a:dgm id="{3372E0D7-7345-40DF-BBA2-A743623239FA}"/>
+                                            </p:graphicEl>
+                                          </p:spTgt>
+                                        </p:tgtEl>
+                                        <p:attrNameLst>
+                                          <p:attrName>style.visibility</p:attrName>
+                                        </p:attrNameLst>
+                                      </p:cBhvr>
+                                      <p:to>
+                                        <p:strVal val="visible"/>
+                                      </p:to>
+                                    </p:set>
+                                    <p:animEffect transition="in" filter="fade">
+                                      <p:cBhvr>
+                                        <p:cTn id="26" dur="500"/>
+                                        <p:tgtEl>
+                                          <p:spTgt spid="6">
+                                            <p:graphicEl>
+                                              <a:dgm id="{3372E0D7-7345-40DF-BBA2-A743623239FA}"/>
+                                            </p:graphicEl>
+                                          </p:spTgt>
+                                        </p:tgtEl>
+                                      </p:cBhvr>
+                                    </p:animEffect>
+                                  </p:childTnLst>
+                                </p:cTn>
+                              </p:par>
+                              <p:par>
+                                <p:cTn id="27" presetID="10" presetClass="entr" presetSubtype="0" fill="hold" grpId="0" nodeType="withEffect">
+                                  <p:stCondLst>
+                                    <p:cond delay="0"/>
+                                  </p:stCondLst>
+                                  <p:childTnLst>
+                                    <p:set>
+                                      <p:cBhvr>
+                                        <p:cTn id="28" dur="1" fill="hold">
+                                          <p:stCondLst>
+                                            <p:cond delay="0"/>
+                                          </p:stCondLst>
+                                        </p:cTn>
+                                        <p:tgtEl>
+                                          <p:spTgt spid="6">
+                                            <p:graphicEl>
+                                              <a:dgm id="{FF15CA57-99EB-4A49-BEDA-B87C1719DA6F}"/>
+                                            </p:graphicEl>
+                                          </p:spTgt>
+                                        </p:tgtEl>
+                                        <p:attrNameLst>
+                                          <p:attrName>style.visibility</p:attrName>
+                                        </p:attrNameLst>
+                                      </p:cBhvr>
+                                      <p:to>
+                                        <p:strVal val="visible"/>
+                                      </p:to>
+                                    </p:set>
+                                    <p:animEffect transition="in" filter="fade">
+                                      <p:cBhvr>
+                                        <p:cTn id="29" dur="500"/>
+                                        <p:tgtEl>
+                                          <p:spTgt spid="6">
+                                            <p:graphicEl>
+                                              <a:dgm id="{FF15CA57-99EB-4A49-BEDA-B87C1719DA6F}"/>
+                                            </p:graphicEl>
+                                          </p:spTgt>
+                                        </p:tgtEl>
+                                      </p:cBhvr>
+                                    </p:animEffect>
+                                  </p:childTnLst>
+                                </p:cTn>
+                              </p:par>
+                            </p:childTnLst>
+                          </p:cTn>
+                        </p:par>
+                      </p:childTnLst>
+                    </p:cTn>
+                  </p:par>
+                  <p:par>
+                    <p:cTn id="30" fill="hold">
+                      <p:stCondLst>
+                        <p:cond delay="indefinite"/>
+                      </p:stCondLst>
+                      <p:childTnLst>
+                        <p:par>
+                          <p:cTn id="31" fill="hold">
+                            <p:stCondLst>
+                              <p:cond delay="0"/>
+                            </p:stCondLst>
+                            <p:childTnLst>
+                              <p:par>
+                                <p:cTn id="32" presetID="10" presetClass="entr" presetSubtype="0" fill="hold" grpId="0" nodeType="clickEffect">
+                                  <p:stCondLst>
+                                    <p:cond delay="0"/>
+                                  </p:stCondLst>
+                                  <p:childTnLst>
+                                    <p:set>
+                                      <p:cBhvr>
+                                        <p:cTn id="33" dur="1" fill="hold">
+                                          <p:stCondLst>
+                                            <p:cond delay="0"/>
+                                          </p:stCondLst>
+                                        </p:cTn>
+                                        <p:tgtEl>
+                                          <p:spTgt spid="6">
+                                            <p:graphicEl>
+                                              <a:dgm id="{20BA1873-8175-425E-8748-05879752D31B}"/>
+                                            </p:graphicEl>
+                                          </p:spTgt>
+                                        </p:tgtEl>
+                                        <p:attrNameLst>
+                                          <p:attrName>style.visibility</p:attrName>
+                                        </p:attrNameLst>
+                                      </p:cBhvr>
+                                      <p:to>
+                                        <p:strVal val="visible"/>
+                                      </p:to>
+                                    </p:set>
+                                    <p:animEffect transition="in" filter="fade">
+                                      <p:cBhvr>
+                                        <p:cTn id="34" dur="500"/>
+                                        <p:tgtEl>
+                                          <p:spTgt spid="6">
+                                            <p:graphicEl>
+                                              <a:dgm id="{20BA1873-8175-425E-8748-05879752D31B}"/>
+                                            </p:graphicEl>
+                                          </p:spTgt>
+                                        </p:tgtEl>
+                                      </p:cBhvr>
+                                    </p:animEffect>
+                                  </p:childTnLst>
+                                </p:cTn>
+                              </p:par>
+                              <p:par>
+                                <p:cTn id="35" presetID="10" presetClass="entr" presetSubtype="0" fill="hold" grpId="0" nodeType="withEffect">
+                                  <p:stCondLst>
+                                    <p:cond delay="0"/>
+                                  </p:stCondLst>
+                                  <p:childTnLst>
+                                    <p:set>
+                                      <p:cBhvr>
+                                        <p:cTn id="36" dur="1" fill="hold">
+                                          <p:stCondLst>
+                                            <p:cond delay="0"/>
+                                          </p:stCondLst>
+                                        </p:cTn>
+                                        <p:tgtEl>
+                                          <p:spTgt spid="6">
+                                            <p:graphicEl>
+                                              <a:dgm id="{44945275-FECF-4A96-ADC7-1C2E0846DBE4}"/>
+                                            </p:graphicEl>
+                                          </p:spTgt>
+                                        </p:tgtEl>
+                                        <p:attrNameLst>
+                                          <p:attrName>style.visibility</p:attrName>
+                                        </p:attrNameLst>
+                                      </p:cBhvr>
+                                      <p:to>
+                                        <p:strVal val="visible"/>
+                                      </p:to>
+                                    </p:set>
+                                    <p:animEffect transition="in" filter="fade">
+                                      <p:cBhvr>
+                                        <p:cTn id="37" dur="500"/>
+                                        <p:tgtEl>
+                                          <p:spTgt spid="6">
+                                            <p:graphicEl>
+                                              <a:dgm id="{44945275-FECF-4A96-ADC7-1C2E0846DBE4}"/>
+                                            </p:graphicEl>
+                                          </p:spTgt>
+                                        </p:tgtEl>
+                                      </p:cBhvr>
+                                    </p:animEffect>
+                                  </p:childTnLst>
+                                </p:cTn>
+                              </p:par>
+                            </p:childTnLst>
+                          </p:cTn>
+                        </p:par>
+                      </p:childTnLst>
+                    </p:cTn>
+                  </p:par>
+                </p:childTnLst>
+              </p:cTn>
+              <p:prevCondLst>
+                <p:cond evt="onPrev" delay="0">
+                  <p:tgtEl>
+                    <p:sldTgt/>
+                  </p:tgtEl>
+                </p:cond>
+              </p:prevCondLst>
+              <p:nextCondLst>
+                <p:cond evt="onNext" delay="0">
+                  <p:tgtEl>
+                    <p:sldTgt/>
+                  </p:tgtEl>
+                </p:cond>
+              </p:nextCondLst>
+            </p:seq>
+          </p:childTnLst>
+        </p:cTn>
+      </p:par>
+    </p:tnLst>
+    <p:bldLst>
+      <p:bldGraphic spid="6" grpId="0">
+        <p:bldSub>
+          <a:bldDgm bld="one"/>
+        </p:bldSub>
+      </p:bldGraphic>
+    </p:bldLst>
+  </p:timing>
 </p:sld>
 </file>
 
@@ -33294,6 +34384,607 @@
   <p:clrMapOvr>
     <a:masterClrMapping/>
   </p:clrMapOvr>
+  <p:timing>
+    <p:tnLst>
+      <p:par>
+        <p:cTn id="1" dur="indefinite" restart="never" nodeType="tmRoot">
+          <p:childTnLst>
+            <p:seq concurrent="1" nextAc="seek">
+              <p:cTn id="2" dur="indefinite" nodeType="mainSeq">
+                <p:childTnLst>
+                  <p:par>
+                    <p:cTn id="3" fill="hold">
+                      <p:stCondLst>
+                        <p:cond delay="indefinite"/>
+                      </p:stCondLst>
+                      <p:childTnLst>
+                        <p:par>
+                          <p:cTn id="4" fill="hold">
+                            <p:stCondLst>
+                              <p:cond delay="0"/>
+                            </p:stCondLst>
+                            <p:childTnLst>
+                              <p:par>
+                                <p:cTn id="5" presetID="2" presetClass="entr" presetSubtype="1" fill="hold" grpId="0" nodeType="clickEffect">
+                                  <p:stCondLst>
+                                    <p:cond delay="0"/>
+                                  </p:stCondLst>
+                                  <p:childTnLst>
+                                    <p:set>
+                                      <p:cBhvr>
+                                        <p:cTn id="6" dur="1" fill="hold">
+                                          <p:stCondLst>
+                                            <p:cond delay="0"/>
+                                          </p:stCondLst>
+                                        </p:cTn>
+                                        <p:tgtEl>
+                                          <p:spTgt spid="5">
+                                            <p:graphicEl>
+                                              <a:dgm id="{D77D0E02-146F-4633-9106-BCB80C1B967B}"/>
+                                            </p:graphicEl>
+                                          </p:spTgt>
+                                        </p:tgtEl>
+                                        <p:attrNameLst>
+                                          <p:attrName>style.visibility</p:attrName>
+                                        </p:attrNameLst>
+                                      </p:cBhvr>
+                                      <p:to>
+                                        <p:strVal val="visible"/>
+                                      </p:to>
+                                    </p:set>
+                                    <p:anim calcmode="lin" valueType="num">
+                                      <p:cBhvr additive="base">
+                                        <p:cTn id="7" dur="500" fill="hold"/>
+                                        <p:tgtEl>
+                                          <p:spTgt spid="5">
+                                            <p:graphicEl>
+                                              <a:dgm id="{D77D0E02-146F-4633-9106-BCB80C1B967B}"/>
+                                            </p:graphicEl>
+                                          </p:spTgt>
+                                        </p:tgtEl>
+                                        <p:attrNameLst>
+                                          <p:attrName>ppt_x</p:attrName>
+                                        </p:attrNameLst>
+                                      </p:cBhvr>
+                                      <p:tavLst>
+                                        <p:tav tm="0">
+                                          <p:val>
+                                            <p:strVal val="#ppt_x"/>
+                                          </p:val>
+                                        </p:tav>
+                                        <p:tav tm="100000">
+                                          <p:val>
+                                            <p:strVal val="#ppt_x"/>
+                                          </p:val>
+                                        </p:tav>
+                                      </p:tavLst>
+                                    </p:anim>
+                                    <p:anim calcmode="lin" valueType="num">
+                                      <p:cBhvr additive="base">
+                                        <p:cTn id="8" dur="500" fill="hold"/>
+                                        <p:tgtEl>
+                                          <p:spTgt spid="5">
+                                            <p:graphicEl>
+                                              <a:dgm id="{D77D0E02-146F-4633-9106-BCB80C1B967B}"/>
+                                            </p:graphicEl>
+                                          </p:spTgt>
+                                        </p:tgtEl>
+                                        <p:attrNameLst>
+                                          <p:attrName>ppt_y</p:attrName>
+                                        </p:attrNameLst>
+                                      </p:cBhvr>
+                                      <p:tavLst>
+                                        <p:tav tm="0">
+                                          <p:val>
+                                            <p:strVal val="0-#ppt_h/2"/>
+                                          </p:val>
+                                        </p:tav>
+                                        <p:tav tm="100000">
+                                          <p:val>
+                                            <p:strVal val="#ppt_y"/>
+                                          </p:val>
+                                        </p:tav>
+                                      </p:tavLst>
+                                    </p:anim>
+                                  </p:childTnLst>
+                                </p:cTn>
+                              </p:par>
+                              <p:par>
+                                <p:cTn id="9" presetID="2" presetClass="entr" presetSubtype="1" fill="hold" grpId="0" nodeType="withEffect">
+                                  <p:stCondLst>
+                                    <p:cond delay="0"/>
+                                  </p:stCondLst>
+                                  <p:childTnLst>
+                                    <p:set>
+                                      <p:cBhvr>
+                                        <p:cTn id="10" dur="1" fill="hold">
+                                          <p:stCondLst>
+                                            <p:cond delay="0"/>
+                                          </p:stCondLst>
+                                        </p:cTn>
+                                        <p:tgtEl>
+                                          <p:spTgt spid="5">
+                                            <p:graphicEl>
+                                              <a:dgm id="{A23A205F-38EA-466D-A73B-94A53A1CB6CA}"/>
+                                            </p:graphicEl>
+                                          </p:spTgt>
+                                        </p:tgtEl>
+                                        <p:attrNameLst>
+                                          <p:attrName>style.visibility</p:attrName>
+                                        </p:attrNameLst>
+                                      </p:cBhvr>
+                                      <p:to>
+                                        <p:strVal val="visible"/>
+                                      </p:to>
+                                    </p:set>
+                                    <p:anim calcmode="lin" valueType="num">
+                                      <p:cBhvr additive="base">
+                                        <p:cTn id="11" dur="500" fill="hold"/>
+                                        <p:tgtEl>
+                                          <p:spTgt spid="5">
+                                            <p:graphicEl>
+                                              <a:dgm id="{A23A205F-38EA-466D-A73B-94A53A1CB6CA}"/>
+                                            </p:graphicEl>
+                                          </p:spTgt>
+                                        </p:tgtEl>
+                                        <p:attrNameLst>
+                                          <p:attrName>ppt_x</p:attrName>
+                                        </p:attrNameLst>
+                                      </p:cBhvr>
+                                      <p:tavLst>
+                                        <p:tav tm="0">
+                                          <p:val>
+                                            <p:strVal val="#ppt_x"/>
+                                          </p:val>
+                                        </p:tav>
+                                        <p:tav tm="100000">
+                                          <p:val>
+                                            <p:strVal val="#ppt_x"/>
+                                          </p:val>
+                                        </p:tav>
+                                      </p:tavLst>
+                                    </p:anim>
+                                    <p:anim calcmode="lin" valueType="num">
+                                      <p:cBhvr additive="base">
+                                        <p:cTn id="12" dur="500" fill="hold"/>
+                                        <p:tgtEl>
+                                          <p:spTgt spid="5">
+                                            <p:graphicEl>
+                                              <a:dgm id="{A23A205F-38EA-466D-A73B-94A53A1CB6CA}"/>
+                                            </p:graphicEl>
+                                          </p:spTgt>
+                                        </p:tgtEl>
+                                        <p:attrNameLst>
+                                          <p:attrName>ppt_y</p:attrName>
+                                        </p:attrNameLst>
+                                      </p:cBhvr>
+                                      <p:tavLst>
+                                        <p:tav tm="0">
+                                          <p:val>
+                                            <p:strVal val="0-#ppt_h/2"/>
+                                          </p:val>
+                                        </p:tav>
+                                        <p:tav tm="100000">
+                                          <p:val>
+                                            <p:strVal val="#ppt_y"/>
+                                          </p:val>
+                                        </p:tav>
+                                      </p:tavLst>
+                                    </p:anim>
+                                  </p:childTnLst>
+                                </p:cTn>
+                              </p:par>
+                            </p:childTnLst>
+                          </p:cTn>
+                        </p:par>
+                      </p:childTnLst>
+                    </p:cTn>
+                  </p:par>
+                  <p:par>
+                    <p:cTn id="13" fill="hold">
+                      <p:stCondLst>
+                        <p:cond delay="indefinite"/>
+                      </p:stCondLst>
+                      <p:childTnLst>
+                        <p:par>
+                          <p:cTn id="14" fill="hold">
+                            <p:stCondLst>
+                              <p:cond delay="0"/>
+                            </p:stCondLst>
+                            <p:childTnLst>
+                              <p:par>
+                                <p:cTn id="15" presetID="2" presetClass="entr" presetSubtype="1" fill="hold" grpId="0" nodeType="clickEffect">
+                                  <p:stCondLst>
+                                    <p:cond delay="0"/>
+                                  </p:stCondLst>
+                                  <p:childTnLst>
+                                    <p:set>
+                                      <p:cBhvr>
+                                        <p:cTn id="16" dur="1" fill="hold">
+                                          <p:stCondLst>
+                                            <p:cond delay="0"/>
+                                          </p:stCondLst>
+                                        </p:cTn>
+                                        <p:tgtEl>
+                                          <p:spTgt spid="5">
+                                            <p:graphicEl>
+                                              <a:dgm id="{719A3758-D0A2-4275-8304-A137EF0402C7}"/>
+                                            </p:graphicEl>
+                                          </p:spTgt>
+                                        </p:tgtEl>
+                                        <p:attrNameLst>
+                                          <p:attrName>style.visibility</p:attrName>
+                                        </p:attrNameLst>
+                                      </p:cBhvr>
+                                      <p:to>
+                                        <p:strVal val="visible"/>
+                                      </p:to>
+                                    </p:set>
+                                    <p:anim calcmode="lin" valueType="num">
+                                      <p:cBhvr additive="base">
+                                        <p:cTn id="17" dur="500" fill="hold"/>
+                                        <p:tgtEl>
+                                          <p:spTgt spid="5">
+                                            <p:graphicEl>
+                                              <a:dgm id="{719A3758-D0A2-4275-8304-A137EF0402C7}"/>
+                                            </p:graphicEl>
+                                          </p:spTgt>
+                                        </p:tgtEl>
+                                        <p:attrNameLst>
+                                          <p:attrName>ppt_x</p:attrName>
+                                        </p:attrNameLst>
+                                      </p:cBhvr>
+                                      <p:tavLst>
+                                        <p:tav tm="0">
+                                          <p:val>
+                                            <p:strVal val="#ppt_x"/>
+                                          </p:val>
+                                        </p:tav>
+                                        <p:tav tm="100000">
+                                          <p:val>
+                                            <p:strVal val="#ppt_x"/>
+                                          </p:val>
+                                        </p:tav>
+                                      </p:tavLst>
+                                    </p:anim>
+                                    <p:anim calcmode="lin" valueType="num">
+                                      <p:cBhvr additive="base">
+                                        <p:cTn id="18" dur="500" fill="hold"/>
+                                        <p:tgtEl>
+                                          <p:spTgt spid="5">
+                                            <p:graphicEl>
+                                              <a:dgm id="{719A3758-D0A2-4275-8304-A137EF0402C7}"/>
+                                            </p:graphicEl>
+                                          </p:spTgt>
+                                        </p:tgtEl>
+                                        <p:attrNameLst>
+                                          <p:attrName>ppt_y</p:attrName>
+                                        </p:attrNameLst>
+                                      </p:cBhvr>
+                                      <p:tavLst>
+                                        <p:tav tm="0">
+                                          <p:val>
+                                            <p:strVal val="0-#ppt_h/2"/>
+                                          </p:val>
+                                        </p:tav>
+                                        <p:tav tm="100000">
+                                          <p:val>
+                                            <p:strVal val="#ppt_y"/>
+                                          </p:val>
+                                        </p:tav>
+                                      </p:tavLst>
+                                    </p:anim>
+                                  </p:childTnLst>
+                                </p:cTn>
+                              </p:par>
+                              <p:par>
+                                <p:cTn id="19" presetID="2" presetClass="entr" presetSubtype="1" fill="hold" grpId="0" nodeType="withEffect">
+                                  <p:stCondLst>
+                                    <p:cond delay="0"/>
+                                  </p:stCondLst>
+                                  <p:childTnLst>
+                                    <p:set>
+                                      <p:cBhvr>
+                                        <p:cTn id="20" dur="1" fill="hold">
+                                          <p:stCondLst>
+                                            <p:cond delay="0"/>
+                                          </p:stCondLst>
+                                        </p:cTn>
+                                        <p:tgtEl>
+                                          <p:spTgt spid="5">
+                                            <p:graphicEl>
+                                              <a:dgm id="{D87B9659-AB68-41CE-8186-623A5B13B042}"/>
+                                            </p:graphicEl>
+                                          </p:spTgt>
+                                        </p:tgtEl>
+                                        <p:attrNameLst>
+                                          <p:attrName>style.visibility</p:attrName>
+                                        </p:attrNameLst>
+                                      </p:cBhvr>
+                                      <p:to>
+                                        <p:strVal val="visible"/>
+                                      </p:to>
+                                    </p:set>
+                                    <p:anim calcmode="lin" valueType="num">
+                                      <p:cBhvr additive="base">
+                                        <p:cTn id="21" dur="500" fill="hold"/>
+                                        <p:tgtEl>
+                                          <p:spTgt spid="5">
+                                            <p:graphicEl>
+                                              <a:dgm id="{D87B9659-AB68-41CE-8186-623A5B13B042}"/>
+                                            </p:graphicEl>
+                                          </p:spTgt>
+                                        </p:tgtEl>
+                                        <p:attrNameLst>
+                                          <p:attrName>ppt_x</p:attrName>
+                                        </p:attrNameLst>
+                                      </p:cBhvr>
+                                      <p:tavLst>
+                                        <p:tav tm="0">
+                                          <p:val>
+                                            <p:strVal val="#ppt_x"/>
+                                          </p:val>
+                                        </p:tav>
+                                        <p:tav tm="100000">
+                                          <p:val>
+                                            <p:strVal val="#ppt_x"/>
+                                          </p:val>
+                                        </p:tav>
+                                      </p:tavLst>
+                                    </p:anim>
+                                    <p:anim calcmode="lin" valueType="num">
+                                      <p:cBhvr additive="base">
+                                        <p:cTn id="22" dur="500" fill="hold"/>
+                                        <p:tgtEl>
+                                          <p:spTgt spid="5">
+                                            <p:graphicEl>
+                                              <a:dgm id="{D87B9659-AB68-41CE-8186-623A5B13B042}"/>
+                                            </p:graphicEl>
+                                          </p:spTgt>
+                                        </p:tgtEl>
+                                        <p:attrNameLst>
+                                          <p:attrName>ppt_y</p:attrName>
+                                        </p:attrNameLst>
+                                      </p:cBhvr>
+                                      <p:tavLst>
+                                        <p:tav tm="0">
+                                          <p:val>
+                                            <p:strVal val="0-#ppt_h/2"/>
+                                          </p:val>
+                                        </p:tav>
+                                        <p:tav tm="100000">
+                                          <p:val>
+                                            <p:strVal val="#ppt_y"/>
+                                          </p:val>
+                                        </p:tav>
+                                      </p:tavLst>
+                                    </p:anim>
+                                  </p:childTnLst>
+                                </p:cTn>
+                              </p:par>
+                            </p:childTnLst>
+                          </p:cTn>
+                        </p:par>
+                      </p:childTnLst>
+                    </p:cTn>
+                  </p:par>
+                  <p:par>
+                    <p:cTn id="23" fill="hold">
+                      <p:stCondLst>
+                        <p:cond delay="indefinite"/>
+                      </p:stCondLst>
+                      <p:childTnLst>
+                        <p:par>
+                          <p:cTn id="24" fill="hold">
+                            <p:stCondLst>
+                              <p:cond delay="0"/>
+                            </p:stCondLst>
+                            <p:childTnLst>
+                              <p:par>
+                                <p:cTn id="25" presetID="2" presetClass="entr" presetSubtype="1" fill="hold" grpId="0" nodeType="clickEffect">
+                                  <p:stCondLst>
+                                    <p:cond delay="0"/>
+                                  </p:stCondLst>
+                                  <p:childTnLst>
+                                    <p:set>
+                                      <p:cBhvr>
+                                        <p:cTn id="26" dur="1" fill="hold">
+                                          <p:stCondLst>
+                                            <p:cond delay="0"/>
+                                          </p:stCondLst>
+                                        </p:cTn>
+                                        <p:tgtEl>
+                                          <p:spTgt spid="5">
+                                            <p:graphicEl>
+                                              <a:dgm id="{99C6DDC6-4BD7-4FE3-8827-B93EB2F50D9F}"/>
+                                            </p:graphicEl>
+                                          </p:spTgt>
+                                        </p:tgtEl>
+                                        <p:attrNameLst>
+                                          <p:attrName>style.visibility</p:attrName>
+                                        </p:attrNameLst>
+                                      </p:cBhvr>
+                                      <p:to>
+                                        <p:strVal val="visible"/>
+                                      </p:to>
+                                    </p:set>
+                                    <p:anim calcmode="lin" valueType="num">
+                                      <p:cBhvr additive="base">
+                                        <p:cTn id="27" dur="500" fill="hold"/>
+                                        <p:tgtEl>
+                                          <p:spTgt spid="5">
+                                            <p:graphicEl>
+                                              <a:dgm id="{99C6DDC6-4BD7-4FE3-8827-B93EB2F50D9F}"/>
+                                            </p:graphicEl>
+                                          </p:spTgt>
+                                        </p:tgtEl>
+                                        <p:attrNameLst>
+                                          <p:attrName>ppt_x</p:attrName>
+                                        </p:attrNameLst>
+                                      </p:cBhvr>
+                                      <p:tavLst>
+                                        <p:tav tm="0">
+                                          <p:val>
+                                            <p:strVal val="#ppt_x"/>
+                                          </p:val>
+                                        </p:tav>
+                                        <p:tav tm="100000">
+                                          <p:val>
+                                            <p:strVal val="#ppt_x"/>
+                                          </p:val>
+                                        </p:tav>
+                                      </p:tavLst>
+                                    </p:anim>
+                                    <p:anim calcmode="lin" valueType="num">
+                                      <p:cBhvr additive="base">
+                                        <p:cTn id="28" dur="500" fill="hold"/>
+                                        <p:tgtEl>
+                                          <p:spTgt spid="5">
+                                            <p:graphicEl>
+                                              <a:dgm id="{99C6DDC6-4BD7-4FE3-8827-B93EB2F50D9F}"/>
+                                            </p:graphicEl>
+                                          </p:spTgt>
+                                        </p:tgtEl>
+                                        <p:attrNameLst>
+                                          <p:attrName>ppt_y</p:attrName>
+                                        </p:attrNameLst>
+                                      </p:cBhvr>
+                                      <p:tavLst>
+                                        <p:tav tm="0">
+                                          <p:val>
+                                            <p:strVal val="0-#ppt_h/2"/>
+                                          </p:val>
+                                        </p:tav>
+                                        <p:tav tm="100000">
+                                          <p:val>
+                                            <p:strVal val="#ppt_y"/>
+                                          </p:val>
+                                        </p:tav>
+                                      </p:tavLst>
+                                    </p:anim>
+                                  </p:childTnLst>
+                                </p:cTn>
+                              </p:par>
+                              <p:par>
+                                <p:cTn id="29" presetID="2" presetClass="entr" presetSubtype="1" fill="hold" grpId="0" nodeType="withEffect">
+                                  <p:stCondLst>
+                                    <p:cond delay="0"/>
+                                  </p:stCondLst>
+                                  <p:childTnLst>
+                                    <p:set>
+                                      <p:cBhvr>
+                                        <p:cTn id="30" dur="1" fill="hold">
+                                          <p:stCondLst>
+                                            <p:cond delay="0"/>
+                                          </p:stCondLst>
+                                        </p:cTn>
+                                        <p:tgtEl>
+                                          <p:spTgt spid="5">
+                                            <p:graphicEl>
+                                              <a:dgm id="{2162F8AB-9CD8-41C6-BCC5-1C58C137DF6E}"/>
+                                            </p:graphicEl>
+                                          </p:spTgt>
+                                        </p:tgtEl>
+                                        <p:attrNameLst>
+                                          <p:attrName>style.visibility</p:attrName>
+                                        </p:attrNameLst>
+                                      </p:cBhvr>
+                                      <p:to>
+                                        <p:strVal val="visible"/>
+                                      </p:to>
+                                    </p:set>
+                                    <p:anim calcmode="lin" valueType="num">
+                                      <p:cBhvr additive="base">
+                                        <p:cTn id="31" dur="500" fill="hold"/>
+                                        <p:tgtEl>
+                                          <p:spTgt spid="5">
+                                            <p:graphicEl>
+                                              <a:dgm id="{2162F8AB-9CD8-41C6-BCC5-1C58C137DF6E}"/>
+                                            </p:graphicEl>
+                                          </p:spTgt>
+                                        </p:tgtEl>
+                                        <p:attrNameLst>
+                                          <p:attrName>ppt_x</p:attrName>
+                                        </p:attrNameLst>
+                                      </p:cBhvr>
+                                      <p:tavLst>
+                                        <p:tav tm="0">
+                                          <p:val>
+                                            <p:strVal val="#ppt_x"/>
+                                          </p:val>
+                                        </p:tav>
+                                        <p:tav tm="100000">
+                                          <p:val>
+                                            <p:strVal val="#ppt_x"/>
+                                          </p:val>
+                                        </p:tav>
+                                      </p:tavLst>
+                                    </p:anim>
+                                    <p:anim calcmode="lin" valueType="num">
+                                      <p:cBhvr additive="base">
+                                        <p:cTn id="32" dur="500" fill="hold"/>
+                                        <p:tgtEl>
+                                          <p:spTgt spid="5">
+                                            <p:graphicEl>
+                                              <a:dgm id="{2162F8AB-9CD8-41C6-BCC5-1C58C137DF6E}"/>
+                                            </p:graphicEl>
+                                          </p:spTgt>
+                                        </p:tgtEl>
+                                        <p:attrNameLst>
+                                          <p:attrName>ppt_y</p:attrName>
+                                        </p:attrNameLst>
+                                      </p:cBhvr>
+                                      <p:tavLst>
+                                        <p:tav tm="0">
+                                          <p:val>
+                                            <p:strVal val="0-#ppt_h/2"/>
+                                          </p:val>
+                                        </p:tav>
+                                        <p:tav tm="100000">
+                                          <p:val>
+                                            <p:strVal val="#ppt_y"/>
+                                          </p:val>
+                                        </p:tav>
+                                      </p:tavLst>
+                                    </p:anim>
+                                  </p:childTnLst>
+                                </p:cTn>
+                              </p:par>
+                            </p:childTnLst>
+                          </p:cTn>
+                        </p:par>
+                      </p:childTnLst>
+                    </p:cTn>
+                  </p:par>
+                </p:childTnLst>
+              </p:cTn>
+              <p:prevCondLst>
+                <p:cond evt="onPrev" delay="0">
+                  <p:tgtEl>
+                    <p:sldTgt/>
+                  </p:tgtEl>
+                </p:cond>
+              </p:prevCondLst>
+              <p:nextCondLst>
+                <p:cond evt="onNext" delay="0">
+                  <p:tgtEl>
+                    <p:sldTgt/>
+                  </p:tgtEl>
+                </p:cond>
+              </p:nextCondLst>
+            </p:seq>
+          </p:childTnLst>
+        </p:cTn>
+      </p:par>
+    </p:tnLst>
+    <p:bldLst>
+      <p:bldGraphic spid="5" grpId="0" uiExpand="1">
+        <p:bldSub>
+          <a:bldDgm bld="one"/>
+        </p:bldSub>
+      </p:bldGraphic>
+    </p:bldLst>
+  </p:timing>
 </p:sld>
 </file>
 

</xml_diff>